<commit_message>
update week 2 review
</commit_message>
<xml_diff>
--- a/lectures/lecture-review-week-2.pptx
+++ b/lectures/lecture-review-week-2.pptx
@@ -7,7 +7,7 @@
   <p:sldIdLst>
     <p:sldId id="257" r:id="rId2"/>
     <p:sldId id="259" r:id="rId3"/>
-    <p:sldId id="258" r:id="rId4"/>
+    <p:sldId id="268" r:id="rId4"/>
     <p:sldId id="260" r:id="rId5"/>
     <p:sldId id="261" r:id="rId6"/>
     <p:sldId id="262" r:id="rId7"/>
@@ -113,6 +113,11 @@
       </a:defRPr>
     </a:lvl9pPr>
   </p:defaultTextStyle>
+  <p:extLst>
+    <p:ext uri="{EFAFB233-063F-42B5-8137-9DF3F51BA10A}">
+      <p15:sldGuideLst xmlns:p15="http://schemas.microsoft.com/office/powerpoint/2012/main"/>
+    </p:ext>
+  </p:extLst>
 </p:presentation>
 </file>
 
@@ -263,7 +268,7 @@
           <a:p>
             <a:fld id="{BCCA4D00-8A20-4344-9629-C2410E08CC07}" type="datetimeFigureOut">
               <a:rPr lang="en-US" smtClean="0"/>
-              <a:t>2/4/18</a:t>
+              <a:t>2/5/18</a:t>
             </a:fld>
             <a:endParaRPr lang="en-US"/>
           </a:p>
@@ -461,7 +466,7 @@
           <a:p>
             <a:fld id="{BCCA4D00-8A20-4344-9629-C2410E08CC07}" type="datetimeFigureOut">
               <a:rPr lang="en-US" smtClean="0"/>
-              <a:t>2/4/18</a:t>
+              <a:t>2/5/18</a:t>
             </a:fld>
             <a:endParaRPr lang="en-US"/>
           </a:p>
@@ -669,7 +674,7 @@
           <a:p>
             <a:fld id="{BCCA4D00-8A20-4344-9629-C2410E08CC07}" type="datetimeFigureOut">
               <a:rPr lang="en-US" smtClean="0"/>
-              <a:t>2/4/18</a:t>
+              <a:t>2/5/18</a:t>
             </a:fld>
             <a:endParaRPr lang="en-US"/>
           </a:p>
@@ -867,7 +872,7 @@
           <a:p>
             <a:fld id="{BCCA4D00-8A20-4344-9629-C2410E08CC07}" type="datetimeFigureOut">
               <a:rPr lang="en-US" smtClean="0"/>
-              <a:t>2/4/18</a:t>
+              <a:t>2/5/18</a:t>
             </a:fld>
             <a:endParaRPr lang="en-US"/>
           </a:p>
@@ -1142,7 +1147,7 @@
           <a:p>
             <a:fld id="{BCCA4D00-8A20-4344-9629-C2410E08CC07}" type="datetimeFigureOut">
               <a:rPr lang="en-US" smtClean="0"/>
-              <a:t>2/4/18</a:t>
+              <a:t>2/5/18</a:t>
             </a:fld>
             <a:endParaRPr lang="en-US"/>
           </a:p>
@@ -1407,7 +1412,7 @@
           <a:p>
             <a:fld id="{BCCA4D00-8A20-4344-9629-C2410E08CC07}" type="datetimeFigureOut">
               <a:rPr lang="en-US" smtClean="0"/>
-              <a:t>2/4/18</a:t>
+              <a:t>2/5/18</a:t>
             </a:fld>
             <a:endParaRPr lang="en-US"/>
           </a:p>
@@ -1819,7 +1824,7 @@
           <a:p>
             <a:fld id="{BCCA4D00-8A20-4344-9629-C2410E08CC07}" type="datetimeFigureOut">
               <a:rPr lang="en-US" smtClean="0"/>
-              <a:t>2/4/18</a:t>
+              <a:t>2/5/18</a:t>
             </a:fld>
             <a:endParaRPr lang="en-US"/>
           </a:p>
@@ -1960,7 +1965,7 @@
           <a:p>
             <a:fld id="{BCCA4D00-8A20-4344-9629-C2410E08CC07}" type="datetimeFigureOut">
               <a:rPr lang="en-US" smtClean="0"/>
-              <a:t>2/4/18</a:t>
+              <a:t>2/5/18</a:t>
             </a:fld>
             <a:endParaRPr lang="en-US"/>
           </a:p>
@@ -2073,7 +2078,7 @@
           <a:p>
             <a:fld id="{BCCA4D00-8A20-4344-9629-C2410E08CC07}" type="datetimeFigureOut">
               <a:rPr lang="en-US" smtClean="0"/>
-              <a:t>2/4/18</a:t>
+              <a:t>2/5/18</a:t>
             </a:fld>
             <a:endParaRPr lang="en-US"/>
           </a:p>
@@ -2384,7 +2389,7 @@
           <a:p>
             <a:fld id="{BCCA4D00-8A20-4344-9629-C2410E08CC07}" type="datetimeFigureOut">
               <a:rPr lang="en-US" smtClean="0"/>
-              <a:t>2/4/18</a:t>
+              <a:t>2/5/18</a:t>
             </a:fld>
             <a:endParaRPr lang="en-US"/>
           </a:p>
@@ -2672,7 +2677,7 @@
           <a:p>
             <a:fld id="{BCCA4D00-8A20-4344-9629-C2410E08CC07}" type="datetimeFigureOut">
               <a:rPr lang="en-US" smtClean="0"/>
-              <a:t>2/4/18</a:t>
+              <a:t>2/5/18</a:t>
             </a:fld>
             <a:endParaRPr lang="en-US"/>
           </a:p>
@@ -2913,7 +2918,7 @@
           <a:p>
             <a:fld id="{BCCA4D00-8A20-4344-9629-C2410E08CC07}" type="datetimeFigureOut">
               <a:rPr lang="en-US" smtClean="0"/>
-              <a:t>2/4/18</a:t>
+              <a:t>2/5/18</a:t>
             </a:fld>
             <a:endParaRPr lang="en-US"/>
           </a:p>
@@ -3368,6 +3373,13 @@
             </a:br>
             <a:r>
               <a:rPr lang="en-US" sz="3600" dirty="0"/>
+              <a:t>Lecture Review </a:t>
+            </a:r>
+            <a:br>
+              <a:rPr lang="en-US" sz="3600" dirty="0"/>
+            </a:br>
+            <a:r>
+              <a:rPr lang="en-US" sz="3600" dirty="0"/>
               <a:t>Week 2: Linux</a:t>
             </a:r>
           </a:p>
@@ -3752,6 +3764,36 @@
           </a:prstGeom>
         </p:spPr>
       </p:pic>
+      <p:pic>
+        <p:nvPicPr>
+          <p:cNvPr id="5" name="Picture 4">
+            <a:extLst>
+              <a:ext uri="{FF2B5EF4-FFF2-40B4-BE49-F238E27FC236}">
+                <a16:creationId xmlns:a16="http://schemas.microsoft.com/office/drawing/2014/main" id="{7EC9DF3E-028F-DC4E-91A3-FD12894FEC20}"/>
+              </a:ext>
+            </a:extLst>
+          </p:cNvPr>
+          <p:cNvPicPr>
+            <a:picLocks noChangeAspect="1"/>
+          </p:cNvPicPr>
+          <p:nvPr/>
+        </p:nvPicPr>
+        <p:blipFill>
+          <a:blip r:embed="rId3"/>
+          <a:stretch>
+            <a:fillRect/>
+          </a:stretch>
+        </p:blipFill>
+        <p:spPr>
+          <a:xfrm>
+            <a:off x="2712202" y="1718510"/>
+            <a:ext cx="1585291" cy="647705"/>
+          </a:xfrm>
+          <a:prstGeom prst="rect">
+            <a:avLst/>
+          </a:prstGeom>
+        </p:spPr>
+      </p:pic>
     </p:spTree>
     <p:extLst>
       <p:ext uri="{BB962C8B-B14F-4D97-AF65-F5344CB8AC3E}">
@@ -3787,7 +3829,7 @@
           <p:cNvPr id="2" name="Title 1">
             <a:extLst>
               <a:ext uri="{FF2B5EF4-FFF2-40B4-BE49-F238E27FC236}">
-                <a16:creationId xmlns:a16="http://schemas.microsoft.com/office/drawing/2014/main" id="{770EB163-6190-E147-A122-5AE24C490FF0}"/>
+                <a16:creationId xmlns:a16="http://schemas.microsoft.com/office/drawing/2014/main" id="{B824C52C-94E9-C74F-AF3A-5A92F5410F16}"/>
               </a:ext>
             </a:extLst>
           </p:cNvPr>
@@ -3805,45 +3847,100 @@
           <a:p>
             <a:r>
               <a:rPr lang="en-US" dirty="0"/>
-              <a:t>Questions</a:t>
-            </a:r>
-          </a:p>
-        </p:txBody>
-      </p:sp>
-      <p:pic>
-        <p:nvPicPr>
-          <p:cNvPr id="4" name="Picture 3">
-            <a:extLst>
-              <a:ext uri="{FF2B5EF4-FFF2-40B4-BE49-F238E27FC236}">
-                <a16:creationId xmlns:a16="http://schemas.microsoft.com/office/drawing/2014/main" id="{96BBC020-2D5B-FE48-BF8A-D1976C08ACDA}"/>
-              </a:ext>
-            </a:extLst>
-          </p:cNvPr>
-          <p:cNvPicPr>
-            <a:picLocks noChangeAspect="1"/>
-          </p:cNvPicPr>
-          <p:nvPr/>
-        </p:nvPicPr>
-        <p:blipFill>
-          <a:blip r:embed="rId2"/>
-          <a:stretch>
-            <a:fillRect/>
-          </a:stretch>
-        </p:blipFill>
-        <p:spPr>
-          <a:xfrm>
-            <a:off x="1651000" y="1612900"/>
-            <a:ext cx="8890000" cy="3632200"/>
-          </a:xfrm>
-          <a:prstGeom prst="rect">
-            <a:avLst/>
-          </a:prstGeom>
-        </p:spPr>
-      </p:pic>
+              <a:t>Note about assignments</a:t>
+            </a:r>
+          </a:p>
+        </p:txBody>
+      </p:sp>
+      <p:sp>
+        <p:nvSpPr>
+          <p:cNvPr id="3" name="Content Placeholder 2">
+            <a:extLst>
+              <a:ext uri="{FF2B5EF4-FFF2-40B4-BE49-F238E27FC236}">
+                <a16:creationId xmlns:a16="http://schemas.microsoft.com/office/drawing/2014/main" id="{84E6F8CE-02F8-5C4E-8A9F-73129D752AB1}"/>
+              </a:ext>
+            </a:extLst>
+          </p:cNvPr>
+          <p:cNvSpPr>
+            <a:spLocks noGrp="1"/>
+          </p:cNvSpPr>
+          <p:nvPr>
+            <p:ph idx="1"/>
+          </p:nvPr>
+        </p:nvSpPr>
+        <p:spPr/>
+        <p:txBody>
+          <a:bodyPr>
+            <a:normAutofit lnSpcReduction="10000"/>
+          </a:bodyPr>
+          <a:lstStyle/>
+          <a:p>
+            <a:r>
+              <a:rPr lang="en-US" dirty="0"/>
+              <a:t>I sometimes make changes to assignments during the semester.</a:t>
+            </a:r>
+          </a:p>
+          <a:p>
+            <a:pPr lvl="1"/>
+            <a:r>
+              <a:rPr lang="en-US" dirty="0"/>
+              <a:t>AWS may make changes to their console or API.</a:t>
+            </a:r>
+          </a:p>
+          <a:p>
+            <a:pPr lvl="1"/>
+            <a:r>
+              <a:rPr lang="en-US" dirty="0"/>
+              <a:t>Students may discover bugs in assignment instructions.</a:t>
+            </a:r>
+          </a:p>
+          <a:p>
+            <a:endParaRPr lang="en-US" dirty="0"/>
+          </a:p>
+          <a:p>
+            <a:r>
+              <a:rPr lang="en-US" dirty="0"/>
+              <a:t>I will publish any assignment changes to </a:t>
+            </a:r>
+            <a:r>
+              <a:rPr lang="en-US" dirty="0" err="1"/>
+              <a:t>Github</a:t>
+            </a:r>
+            <a:r>
+              <a:rPr lang="en-US" dirty="0"/>
+              <a:t> and Slack.</a:t>
+            </a:r>
+          </a:p>
+          <a:p>
+            <a:pPr lvl="1"/>
+            <a:r>
+              <a:rPr lang="en-US" dirty="0"/>
+              <a:t>If you clone or fork the class repository, you should pull updates weekly to ensure that you are reading the latest information.</a:t>
+            </a:r>
+          </a:p>
+          <a:p>
+            <a:pPr lvl="1"/>
+            <a:endParaRPr lang="en-US" dirty="0"/>
+          </a:p>
+          <a:p>
+            <a:pPr lvl="1"/>
+            <a:r>
+              <a:rPr lang="en-US" dirty="0"/>
+              <a:t>Warning: If you decide to work on a homework assignment which has not been assigned yet, there is always a possibility that I will change that assignment. </a:t>
+            </a:r>
+          </a:p>
+          <a:p>
+            <a:endParaRPr lang="en-US" dirty="0"/>
+          </a:p>
+          <a:p>
+            <a:endParaRPr lang="en-US" dirty="0"/>
+          </a:p>
+        </p:txBody>
+      </p:sp>
     </p:spTree>
     <p:extLst>
       <p:ext uri="{BB962C8B-B14F-4D97-AF65-F5344CB8AC3E}">
-        <p14:creationId xmlns:p14="http://schemas.microsoft.com/office/powerpoint/2010/main" val="1117625880"/>
+        <p14:creationId xmlns:p14="http://schemas.microsoft.com/office/powerpoint/2010/main" val="3430002121"/>
       </p:ext>
     </p:extLst>
   </p:cSld>
@@ -4091,7 +4188,7 @@
             <a:pPr lvl="1"/>
             <a:r>
               <a:rPr lang="en-US" dirty="0"/>
-              <a:t>Set and print a value:</a:t>
+              <a:t>Set and print a value (spaces matter!):</a:t>
             </a:r>
           </a:p>
           <a:p>

</xml_diff>